<commit_message>
add 3.2 and 3.3
</commit_message>
<xml_diff>
--- a/Mastering_Python’s_openpyxl.pptx
+++ b/Mastering_Python’s_openpyxl.pptx
@@ -5,7 +5,7 @@
     <p:sldMasterId id="2147483671" r:id="rId4"/>
   </p:sldMasterIdLst>
   <p:notesMasterIdLst>
-    <p:notesMasterId r:id="rId17"/>
+    <p:notesMasterId r:id="rId22"/>
   </p:notesMasterIdLst>
   <p:sldIdLst>
     <p:sldId id="320" r:id="rId5"/>
@@ -19,7 +19,12 @@
     <p:sldId id="329" r:id="rId13"/>
     <p:sldId id="330" r:id="rId14"/>
     <p:sldId id="331" r:id="rId15"/>
-    <p:sldId id="321" r:id="rId16"/>
+    <p:sldId id="332" r:id="rId16"/>
+    <p:sldId id="333" r:id="rId17"/>
+    <p:sldId id="334" r:id="rId18"/>
+    <p:sldId id="335" r:id="rId19"/>
+    <p:sldId id="336" r:id="rId20"/>
+    <p:sldId id="321" r:id="rId21"/>
   </p:sldIdLst>
   <p:sldSz cx="12192000" cy="6858000"/>
   <p:notesSz cx="6858000" cy="9144000"/>
@@ -146,6 +151,11 @@
         <p14:section name="ch3_cell_&amp;_cell_values" id="{1F93CB3F-BB5B-4B8E-AE95-046B6B187FC7}">
           <p14:sldIdLst>
             <p14:sldId id="331"/>
+            <p14:sldId id="332"/>
+            <p14:sldId id="333"/>
+            <p14:sldId id="334"/>
+            <p14:sldId id="335"/>
+            <p14:sldId id="336"/>
           </p14:sldIdLst>
         </p14:section>
         <p14:section name="covers" id="{4F2CDF44-8EA2-4CD8-A232-2646FBA1D618}">
@@ -7717,6 +7727,1556 @@
 </file>
 
 <file path=ppt/slides/slide12.xml><?xml version="1.0" encoding="utf-8"?>
+<p:sld xmlns:a="http://schemas.openxmlformats.org/drawingml/2006/main" xmlns:r="http://schemas.openxmlformats.org/officeDocument/2006/relationships" xmlns:p="http://schemas.openxmlformats.org/presentationml/2006/main">
+  <p:cSld>
+    <p:spTree>
+      <p:nvGrpSpPr>
+        <p:cNvPr id="1" name="">
+          <a:extLst>
+            <a:ext uri="{FF2B5EF4-FFF2-40B4-BE49-F238E27FC236}">
+              <a16:creationId xmlns:a16="http://schemas.microsoft.com/office/drawing/2014/main" id="{B934E226-7E46-4785-F85D-09BD970DBFC8}"/>
+            </a:ext>
+          </a:extLst>
+        </p:cNvPr>
+        <p:cNvGrpSpPr/>
+        <p:nvPr/>
+      </p:nvGrpSpPr>
+      <p:grpSpPr>
+        <a:xfrm>
+          <a:off x="0" y="0"/>
+          <a:ext cx="0" cy="0"/>
+          <a:chOff x="0" y="0"/>
+          <a:chExt cx="0" cy="0"/>
+        </a:xfrm>
+      </p:grpSpPr>
+      <p:pic>
+        <p:nvPicPr>
+          <p:cNvPr id="10" name="Picture 9">
+            <a:extLst>
+              <a:ext uri="{FF2B5EF4-FFF2-40B4-BE49-F238E27FC236}">
+                <a16:creationId xmlns:a16="http://schemas.microsoft.com/office/drawing/2014/main" id="{90683E2A-24BE-716A-CC44-104AC0656D42}"/>
+              </a:ext>
+            </a:extLst>
+          </p:cNvPr>
+          <p:cNvPicPr>
+            <a:picLocks noChangeAspect="1"/>
+          </p:cNvPicPr>
+          <p:nvPr/>
+        </p:nvPicPr>
+        <p:blipFill>
+          <a:blip r:embed="rId2"/>
+          <a:stretch>
+            <a:fillRect/>
+          </a:stretch>
+        </p:blipFill>
+        <p:spPr>
+          <a:xfrm>
+            <a:off x="408940" y="345986"/>
+            <a:ext cx="9053443" cy="5772956"/>
+          </a:xfrm>
+          <a:prstGeom prst="roundRect">
+            <a:avLst>
+              <a:gd name="adj" fmla="val 16667"/>
+            </a:avLst>
+          </a:prstGeom>
+          <a:ln>
+            <a:noFill/>
+          </a:ln>
+          <a:effectLst>
+            <a:outerShdw blurRad="152400" dist="12000" dir="900000" sy="98000" kx="110000" ky="200000" algn="tl" rotWithShape="0">
+              <a:srgbClr val="000000">
+                <a:alpha val="30000"/>
+              </a:srgbClr>
+            </a:outerShdw>
+          </a:effectLst>
+          <a:scene3d>
+            <a:camera prst="perspectiveRelaxed">
+              <a:rot lat="19800000" lon="1200000" rev="20820000"/>
+            </a:camera>
+            <a:lightRig rig="threePt" dir="t"/>
+          </a:scene3d>
+          <a:sp3d contourW="6350" prstMaterial="matte">
+            <a:bevelT w="101600" h="101600"/>
+            <a:contourClr>
+              <a:srgbClr val="969696"/>
+            </a:contourClr>
+          </a:sp3d>
+        </p:spPr>
+      </p:pic>
+      <p:sp>
+        <p:nvSpPr>
+          <p:cNvPr id="5" name="Title 4">
+            <a:extLst>
+              <a:ext uri="{FF2B5EF4-FFF2-40B4-BE49-F238E27FC236}">
+                <a16:creationId xmlns:a16="http://schemas.microsoft.com/office/drawing/2014/main" id="{929B67F1-42CE-C4B7-C8CC-ABFE013A93A7}"/>
+              </a:ext>
+            </a:extLst>
+          </p:cNvPr>
+          <p:cNvSpPr>
+            <a:spLocks noGrp="1"/>
+          </p:cNvSpPr>
+          <p:nvPr>
+            <p:ph type="title"/>
+          </p:nvPr>
+        </p:nvSpPr>
+        <p:spPr>
+          <a:xfrm>
+            <a:off x="2174240" y="72887"/>
+            <a:ext cx="9255756" cy="1077003"/>
+          </a:xfrm>
+        </p:spPr>
+        <p:txBody>
+          <a:bodyPr/>
+          <a:lstStyle/>
+          <a:p>
+            <a:pPr algn="ctr"/>
+            <a:r>
+              <a:rPr lang="en-US" dirty="0">
+                <a:solidFill>
+                  <a:schemeClr val="accent4">
+                    <a:lumMod val="75000"/>
+                  </a:schemeClr>
+                </a:solidFill>
+                <a:latin typeface="Aharoni" panose="02010803020104030203" pitchFamily="2" charset="-79"/>
+                <a:cs typeface="Aharoni" panose="02010803020104030203" pitchFamily="2" charset="-79"/>
+              </a:rPr>
+              <a:t>Mastering openpyxl</a:t>
+            </a:r>
+          </a:p>
+        </p:txBody>
+      </p:sp>
+      <p:sp>
+        <p:nvSpPr>
+          <p:cNvPr id="8" name="TextBox 7">
+            <a:extLst>
+              <a:ext uri="{FF2B5EF4-FFF2-40B4-BE49-F238E27FC236}">
+                <a16:creationId xmlns:a16="http://schemas.microsoft.com/office/drawing/2014/main" id="{C3A10AE6-50F9-56D3-D40C-BBABF42DC320}"/>
+              </a:ext>
+            </a:extLst>
+          </p:cNvPr>
+          <p:cNvSpPr txBox="1"/>
+          <p:nvPr/>
+        </p:nvSpPr>
+        <p:spPr>
+          <a:xfrm>
+            <a:off x="0" y="4859"/>
+            <a:ext cx="2336800" cy="1446550"/>
+          </a:xfrm>
+          <a:prstGeom prst="rect">
+            <a:avLst/>
+          </a:prstGeom>
+          <a:effectLst>
+            <a:outerShdw blurRad="76200" dist="12700" dir="2700000" sy="-23000" kx="-800400" algn="bl" rotWithShape="0">
+              <a:prstClr val="black">
+                <a:alpha val="20000"/>
+              </a:prstClr>
+            </a:outerShdw>
+          </a:effectLst>
+        </p:spPr>
+        <p:style>
+          <a:lnRef idx="1">
+            <a:schemeClr val="accent6"/>
+          </a:lnRef>
+          <a:fillRef idx="2">
+            <a:schemeClr val="accent6"/>
+          </a:fillRef>
+          <a:effectRef idx="1">
+            <a:schemeClr val="accent6"/>
+          </a:effectRef>
+          <a:fontRef idx="minor">
+            <a:schemeClr val="dk1"/>
+          </a:fontRef>
+        </p:style>
+        <p:txBody>
+          <a:bodyPr wrap="square" rtlCol="0" anchor="ctr">
+            <a:spAutoFit/>
+          </a:bodyPr>
+          <a:lstStyle/>
+          <a:p>
+            <a:pPr algn="ctr"/>
+            <a:r>
+              <a:rPr lang="en-US" sz="8800" dirty="0">
+                <a:solidFill>
+                  <a:schemeClr val="accent5"/>
+                </a:solidFill>
+                <a:latin typeface="Trade Gothic Next Heavy" panose="020F0502020204030204" pitchFamily="34" charset="0"/>
+              </a:rPr>
+              <a:t>012</a:t>
+            </a:r>
+          </a:p>
+        </p:txBody>
+      </p:sp>
+      <p:pic>
+        <p:nvPicPr>
+          <p:cNvPr id="9" name="Picture 8">
+            <a:extLst>
+              <a:ext uri="{FF2B5EF4-FFF2-40B4-BE49-F238E27FC236}">
+                <a16:creationId xmlns:a16="http://schemas.microsoft.com/office/drawing/2014/main" id="{AD22B2AD-5BD5-CE3F-D494-A8432FD1D6F8}"/>
+              </a:ext>
+            </a:extLst>
+          </p:cNvPr>
+          <p:cNvPicPr>
+            <a:picLocks noChangeAspect="1"/>
+          </p:cNvPicPr>
+          <p:nvPr/>
+        </p:nvPicPr>
+        <p:blipFill>
+          <a:blip r:embed="rId3"/>
+          <a:stretch>
+            <a:fillRect/>
+          </a:stretch>
+        </p:blipFill>
+        <p:spPr>
+          <a:xfrm>
+            <a:off x="172720" y="5574693"/>
+            <a:ext cx="2661920" cy="1088498"/>
+          </a:xfrm>
+          <a:prstGeom prst="roundRect">
+            <a:avLst>
+              <a:gd name="adj" fmla="val 8594"/>
+            </a:avLst>
+          </a:prstGeom>
+          <a:solidFill>
+            <a:srgbClr val="FFFFFF">
+              <a:shade val="85000"/>
+            </a:srgbClr>
+          </a:solidFill>
+          <a:ln>
+            <a:noFill/>
+          </a:ln>
+          <a:effectLst>
+            <a:reflection blurRad="12700" stA="38000" endPos="28000" dist="5000" dir="5400000" sy="-100000" algn="bl" rotWithShape="0"/>
+          </a:effectLst>
+        </p:spPr>
+      </p:pic>
+      <p:sp>
+        <p:nvSpPr>
+          <p:cNvPr id="7" name="Content Placeholder 6">
+            <a:extLst>
+              <a:ext uri="{FF2B5EF4-FFF2-40B4-BE49-F238E27FC236}">
+                <a16:creationId xmlns:a16="http://schemas.microsoft.com/office/drawing/2014/main" id="{44A6EB7F-0505-6926-2973-B8C7D5B15C1D}"/>
+              </a:ext>
+            </a:extLst>
+          </p:cNvPr>
+          <p:cNvSpPr>
+            <a:spLocks noGrp="1"/>
+          </p:cNvSpPr>
+          <p:nvPr>
+            <p:ph sz="quarter" idx="10"/>
+          </p:nvPr>
+        </p:nvSpPr>
+        <p:spPr>
+          <a:xfrm>
+            <a:off x="3032760" y="5076647"/>
+            <a:ext cx="8750300" cy="1781353"/>
+          </a:xfrm>
+          <a:ln>
+            <a:noFill/>
+          </a:ln>
+        </p:spPr>
+        <p:style>
+          <a:lnRef idx="1">
+            <a:schemeClr val="accent3"/>
+          </a:lnRef>
+          <a:fillRef idx="2">
+            <a:schemeClr val="accent3"/>
+          </a:fillRef>
+          <a:effectRef idx="1">
+            <a:schemeClr val="accent3"/>
+          </a:effectRef>
+          <a:fontRef idx="minor">
+            <a:schemeClr val="dk1"/>
+          </a:fontRef>
+        </p:style>
+        <p:txBody>
+          <a:bodyPr anchor="ctr">
+            <a:normAutofit fontScale="85000" lnSpcReduction="20000"/>
+          </a:bodyPr>
+          <a:lstStyle/>
+          <a:p>
+            <a:r>
+              <a:rPr lang="en-US" sz="4400" b="1" dirty="0">
+                <a:solidFill>
+                  <a:schemeClr val="accent4">
+                    <a:lumMod val="75000"/>
+                  </a:schemeClr>
+                </a:solidFill>
+                <a:latin typeface="72 Black" panose="020B0A04030603020204" pitchFamily="34" charset="0"/>
+                <a:cs typeface="72 Black" panose="020B0A04030603020204" pitchFamily="34" charset="0"/>
+              </a:rPr>
+              <a:t>3. Cells and Cells Values</a:t>
+            </a:r>
+          </a:p>
+          <a:p>
+            <a:r>
+              <a:rPr lang="en-US" sz="4400" b="1" dirty="0">
+                <a:solidFill>
+                  <a:schemeClr val="accent4">
+                    <a:lumMod val="75000"/>
+                  </a:schemeClr>
+                </a:solidFill>
+                <a:latin typeface="72 Black" panose="020B0A04030603020204" pitchFamily="34" charset="0"/>
+                <a:cs typeface="72 Black" panose="020B0A04030603020204" pitchFamily="34" charset="0"/>
+              </a:rPr>
+              <a:t>3.2 Setting Cell Values &amp; 3.3 Data Types</a:t>
+            </a:r>
+          </a:p>
+        </p:txBody>
+      </p:sp>
+    </p:spTree>
+    <p:extLst>
+      <p:ext uri="{BB962C8B-B14F-4D97-AF65-F5344CB8AC3E}">
+        <p14:creationId xmlns:p14="http://schemas.microsoft.com/office/powerpoint/2010/main" val="2330025596"/>
+      </p:ext>
+    </p:extLst>
+  </p:cSld>
+  <p:clrMapOvr>
+    <a:masterClrMapping/>
+  </p:clrMapOvr>
+</p:sld>
+</file>
+
+<file path=ppt/slides/slide13.xml><?xml version="1.0" encoding="utf-8"?>
+<p:sld xmlns:a="http://schemas.openxmlformats.org/drawingml/2006/main" xmlns:r="http://schemas.openxmlformats.org/officeDocument/2006/relationships" xmlns:p="http://schemas.openxmlformats.org/presentationml/2006/main">
+  <p:cSld>
+    <p:spTree>
+      <p:nvGrpSpPr>
+        <p:cNvPr id="1" name="">
+          <a:extLst>
+            <a:ext uri="{FF2B5EF4-FFF2-40B4-BE49-F238E27FC236}">
+              <a16:creationId xmlns:a16="http://schemas.microsoft.com/office/drawing/2014/main" id="{E849AAE0-2A43-C928-BF63-CEE6B5D059E3}"/>
+            </a:ext>
+          </a:extLst>
+        </p:cNvPr>
+        <p:cNvGrpSpPr/>
+        <p:nvPr/>
+      </p:nvGrpSpPr>
+      <p:grpSpPr>
+        <a:xfrm>
+          <a:off x="0" y="0"/>
+          <a:ext cx="0" cy="0"/>
+          <a:chOff x="0" y="0"/>
+          <a:chExt cx="0" cy="0"/>
+        </a:xfrm>
+      </p:grpSpPr>
+      <p:pic>
+        <p:nvPicPr>
+          <p:cNvPr id="4" name="Picture 3">
+            <a:extLst>
+              <a:ext uri="{FF2B5EF4-FFF2-40B4-BE49-F238E27FC236}">
+                <a16:creationId xmlns:a16="http://schemas.microsoft.com/office/drawing/2014/main" id="{B2EDA4AF-181A-5E02-2EAB-AE4D23728202}"/>
+              </a:ext>
+            </a:extLst>
+          </p:cNvPr>
+          <p:cNvPicPr>
+            <a:picLocks noChangeAspect="1"/>
+          </p:cNvPicPr>
+          <p:nvPr/>
+        </p:nvPicPr>
+        <p:blipFill>
+          <a:blip r:embed="rId2"/>
+          <a:stretch>
+            <a:fillRect/>
+          </a:stretch>
+        </p:blipFill>
+        <p:spPr>
+          <a:xfrm>
+            <a:off x="408940" y="413893"/>
+            <a:ext cx="9177275" cy="5896798"/>
+          </a:xfrm>
+          <a:prstGeom prst="roundRect">
+            <a:avLst>
+              <a:gd name="adj" fmla="val 16667"/>
+            </a:avLst>
+          </a:prstGeom>
+          <a:ln>
+            <a:noFill/>
+          </a:ln>
+          <a:effectLst>
+            <a:outerShdw blurRad="152400" dist="12000" dir="900000" sy="98000" kx="110000" ky="200000" algn="tl" rotWithShape="0">
+              <a:srgbClr val="000000">
+                <a:alpha val="30000"/>
+              </a:srgbClr>
+            </a:outerShdw>
+          </a:effectLst>
+          <a:scene3d>
+            <a:camera prst="perspectiveRelaxed">
+              <a:rot lat="19800000" lon="1200000" rev="20820000"/>
+            </a:camera>
+            <a:lightRig rig="threePt" dir="t"/>
+          </a:scene3d>
+          <a:sp3d contourW="6350" prstMaterial="matte">
+            <a:bevelT w="101600" h="101600"/>
+            <a:contourClr>
+              <a:srgbClr val="969696"/>
+            </a:contourClr>
+          </a:sp3d>
+        </p:spPr>
+      </p:pic>
+      <p:sp>
+        <p:nvSpPr>
+          <p:cNvPr id="5" name="Title 4">
+            <a:extLst>
+              <a:ext uri="{FF2B5EF4-FFF2-40B4-BE49-F238E27FC236}">
+                <a16:creationId xmlns:a16="http://schemas.microsoft.com/office/drawing/2014/main" id="{0C91960C-D693-FDB7-2EDA-4B2678F7B5FD}"/>
+              </a:ext>
+            </a:extLst>
+          </p:cNvPr>
+          <p:cNvSpPr>
+            <a:spLocks noGrp="1"/>
+          </p:cNvSpPr>
+          <p:nvPr>
+            <p:ph type="title"/>
+          </p:nvPr>
+        </p:nvSpPr>
+        <p:spPr>
+          <a:xfrm>
+            <a:off x="2174240" y="72887"/>
+            <a:ext cx="9255756" cy="1077003"/>
+          </a:xfrm>
+        </p:spPr>
+        <p:txBody>
+          <a:bodyPr/>
+          <a:lstStyle/>
+          <a:p>
+            <a:pPr algn="ctr"/>
+            <a:r>
+              <a:rPr lang="en-US" dirty="0">
+                <a:solidFill>
+                  <a:schemeClr val="accent4">
+                    <a:lumMod val="75000"/>
+                  </a:schemeClr>
+                </a:solidFill>
+                <a:latin typeface="Aharoni" panose="02010803020104030203" pitchFamily="2" charset="-79"/>
+                <a:cs typeface="Aharoni" panose="02010803020104030203" pitchFamily="2" charset="-79"/>
+              </a:rPr>
+              <a:t>Mastering openpyxl</a:t>
+            </a:r>
+          </a:p>
+        </p:txBody>
+      </p:sp>
+      <p:sp>
+        <p:nvSpPr>
+          <p:cNvPr id="8" name="TextBox 7">
+            <a:extLst>
+              <a:ext uri="{FF2B5EF4-FFF2-40B4-BE49-F238E27FC236}">
+                <a16:creationId xmlns:a16="http://schemas.microsoft.com/office/drawing/2014/main" id="{BCA588D2-F9EB-9623-FF77-E6371081A5A4}"/>
+              </a:ext>
+            </a:extLst>
+          </p:cNvPr>
+          <p:cNvSpPr txBox="1"/>
+          <p:nvPr/>
+        </p:nvSpPr>
+        <p:spPr>
+          <a:xfrm>
+            <a:off x="0" y="4859"/>
+            <a:ext cx="2336800" cy="1446550"/>
+          </a:xfrm>
+          <a:prstGeom prst="rect">
+            <a:avLst/>
+          </a:prstGeom>
+          <a:effectLst>
+            <a:outerShdw blurRad="76200" dist="12700" dir="2700000" sy="-23000" kx="-800400" algn="bl" rotWithShape="0">
+              <a:prstClr val="black">
+                <a:alpha val="20000"/>
+              </a:prstClr>
+            </a:outerShdw>
+          </a:effectLst>
+        </p:spPr>
+        <p:style>
+          <a:lnRef idx="1">
+            <a:schemeClr val="accent6"/>
+          </a:lnRef>
+          <a:fillRef idx="2">
+            <a:schemeClr val="accent6"/>
+          </a:fillRef>
+          <a:effectRef idx="1">
+            <a:schemeClr val="accent6"/>
+          </a:effectRef>
+          <a:fontRef idx="minor">
+            <a:schemeClr val="dk1"/>
+          </a:fontRef>
+        </p:style>
+        <p:txBody>
+          <a:bodyPr wrap="square" rtlCol="0" anchor="ctr">
+            <a:spAutoFit/>
+          </a:bodyPr>
+          <a:lstStyle/>
+          <a:p>
+            <a:pPr algn="ctr"/>
+            <a:r>
+              <a:rPr lang="en-US" sz="8800" dirty="0">
+                <a:solidFill>
+                  <a:schemeClr val="accent5"/>
+                </a:solidFill>
+                <a:latin typeface="Trade Gothic Next Heavy" panose="020F0502020204030204" pitchFamily="34" charset="0"/>
+              </a:rPr>
+              <a:t>013</a:t>
+            </a:r>
+          </a:p>
+        </p:txBody>
+      </p:sp>
+      <p:pic>
+        <p:nvPicPr>
+          <p:cNvPr id="9" name="Picture 8">
+            <a:extLst>
+              <a:ext uri="{FF2B5EF4-FFF2-40B4-BE49-F238E27FC236}">
+                <a16:creationId xmlns:a16="http://schemas.microsoft.com/office/drawing/2014/main" id="{7BB6E5A0-E09C-E9C0-1B7D-2C23F358CFF8}"/>
+              </a:ext>
+            </a:extLst>
+          </p:cNvPr>
+          <p:cNvPicPr>
+            <a:picLocks noChangeAspect="1"/>
+          </p:cNvPicPr>
+          <p:nvPr/>
+        </p:nvPicPr>
+        <p:blipFill>
+          <a:blip r:embed="rId3"/>
+          <a:stretch>
+            <a:fillRect/>
+          </a:stretch>
+        </p:blipFill>
+        <p:spPr>
+          <a:xfrm>
+            <a:off x="172720" y="5574693"/>
+            <a:ext cx="2661920" cy="1088498"/>
+          </a:xfrm>
+          <a:prstGeom prst="roundRect">
+            <a:avLst>
+              <a:gd name="adj" fmla="val 8594"/>
+            </a:avLst>
+          </a:prstGeom>
+          <a:solidFill>
+            <a:srgbClr val="FFFFFF">
+              <a:shade val="85000"/>
+            </a:srgbClr>
+          </a:solidFill>
+          <a:ln>
+            <a:noFill/>
+          </a:ln>
+          <a:effectLst>
+            <a:reflection blurRad="12700" stA="38000" endPos="28000" dist="5000" dir="5400000" sy="-100000" algn="bl" rotWithShape="0"/>
+          </a:effectLst>
+        </p:spPr>
+      </p:pic>
+      <p:sp>
+        <p:nvSpPr>
+          <p:cNvPr id="7" name="Content Placeholder 6">
+            <a:extLst>
+              <a:ext uri="{FF2B5EF4-FFF2-40B4-BE49-F238E27FC236}">
+                <a16:creationId xmlns:a16="http://schemas.microsoft.com/office/drawing/2014/main" id="{2CC77823-B51E-CF2D-08F9-B854229DE8CC}"/>
+              </a:ext>
+            </a:extLst>
+          </p:cNvPr>
+          <p:cNvSpPr>
+            <a:spLocks noGrp="1"/>
+          </p:cNvSpPr>
+          <p:nvPr>
+            <p:ph sz="quarter" idx="10"/>
+          </p:nvPr>
+        </p:nvSpPr>
+        <p:spPr>
+          <a:xfrm>
+            <a:off x="3032760" y="5076647"/>
+            <a:ext cx="8750300" cy="1781353"/>
+          </a:xfrm>
+          <a:ln>
+            <a:noFill/>
+          </a:ln>
+        </p:spPr>
+        <p:style>
+          <a:lnRef idx="1">
+            <a:schemeClr val="accent3"/>
+          </a:lnRef>
+          <a:fillRef idx="2">
+            <a:schemeClr val="accent3"/>
+          </a:fillRef>
+          <a:effectRef idx="1">
+            <a:schemeClr val="accent3"/>
+          </a:effectRef>
+          <a:fontRef idx="minor">
+            <a:schemeClr val="dk1"/>
+          </a:fontRef>
+        </p:style>
+        <p:txBody>
+          <a:bodyPr anchor="ctr">
+            <a:normAutofit/>
+          </a:bodyPr>
+          <a:lstStyle/>
+          <a:p>
+            <a:r>
+              <a:rPr lang="en-US" sz="4400" b="1" dirty="0">
+                <a:solidFill>
+                  <a:schemeClr val="accent4">
+                    <a:lumMod val="75000"/>
+                  </a:schemeClr>
+                </a:solidFill>
+                <a:latin typeface="72 Black" panose="020B0A04030603020204" pitchFamily="34" charset="0"/>
+                <a:cs typeface="72 Black" panose="020B0A04030603020204" pitchFamily="34" charset="0"/>
+              </a:rPr>
+              <a:t>3. Cells and Cells Values</a:t>
+            </a:r>
+          </a:p>
+          <a:p>
+            <a:r>
+              <a:rPr lang="en-US" sz="4400" b="1" dirty="0">
+                <a:solidFill>
+                  <a:schemeClr val="accent4">
+                    <a:lumMod val="75000"/>
+                  </a:schemeClr>
+                </a:solidFill>
+                <a:latin typeface="72 Black" panose="020B0A04030603020204" pitchFamily="34" charset="0"/>
+                <a:cs typeface="72 Black" panose="020B0A04030603020204" pitchFamily="34" charset="0"/>
+              </a:rPr>
+              <a:t>3.4 Formulas and Calculations</a:t>
+            </a:r>
+          </a:p>
+        </p:txBody>
+      </p:sp>
+    </p:spTree>
+    <p:extLst>
+      <p:ext uri="{BB962C8B-B14F-4D97-AF65-F5344CB8AC3E}">
+        <p14:creationId xmlns:p14="http://schemas.microsoft.com/office/powerpoint/2010/main" val="4282287979"/>
+      </p:ext>
+    </p:extLst>
+  </p:cSld>
+  <p:clrMapOvr>
+    <a:masterClrMapping/>
+  </p:clrMapOvr>
+</p:sld>
+</file>
+
+<file path=ppt/slides/slide14.xml><?xml version="1.0" encoding="utf-8"?>
+<p:sld xmlns:a="http://schemas.openxmlformats.org/drawingml/2006/main" xmlns:r="http://schemas.openxmlformats.org/officeDocument/2006/relationships" xmlns:p="http://schemas.openxmlformats.org/presentationml/2006/main">
+  <p:cSld>
+    <p:spTree>
+      <p:nvGrpSpPr>
+        <p:cNvPr id="1" name="">
+          <a:extLst>
+            <a:ext uri="{FF2B5EF4-FFF2-40B4-BE49-F238E27FC236}">
+              <a16:creationId xmlns:a16="http://schemas.microsoft.com/office/drawing/2014/main" id="{471C64CE-D672-06DA-801F-038DC0C0E82C}"/>
+            </a:ext>
+          </a:extLst>
+        </p:cNvPr>
+        <p:cNvGrpSpPr/>
+        <p:nvPr/>
+      </p:nvGrpSpPr>
+      <p:grpSpPr>
+        <a:xfrm>
+          <a:off x="0" y="0"/>
+          <a:ext cx="0" cy="0"/>
+          <a:chOff x="0" y="0"/>
+          <a:chExt cx="0" cy="0"/>
+        </a:xfrm>
+      </p:grpSpPr>
+      <p:pic>
+        <p:nvPicPr>
+          <p:cNvPr id="3" name="Picture 2">
+            <a:extLst>
+              <a:ext uri="{FF2B5EF4-FFF2-40B4-BE49-F238E27FC236}">
+                <a16:creationId xmlns:a16="http://schemas.microsoft.com/office/drawing/2014/main" id="{57CC7667-3D5C-107F-7454-E859BFBD1512}"/>
+              </a:ext>
+            </a:extLst>
+          </p:cNvPr>
+          <p:cNvPicPr>
+            <a:picLocks noChangeAspect="1"/>
+          </p:cNvPicPr>
+          <p:nvPr/>
+        </p:nvPicPr>
+        <p:blipFill>
+          <a:blip r:embed="rId2"/>
+          <a:stretch>
+            <a:fillRect/>
+          </a:stretch>
+        </p:blipFill>
+        <p:spPr>
+          <a:xfrm>
+            <a:off x="587441" y="523469"/>
+            <a:ext cx="9301626" cy="5811061"/>
+          </a:xfrm>
+          <a:prstGeom prst="roundRect">
+            <a:avLst>
+              <a:gd name="adj" fmla="val 16667"/>
+            </a:avLst>
+          </a:prstGeom>
+          <a:ln>
+            <a:noFill/>
+          </a:ln>
+          <a:effectLst>
+            <a:outerShdw blurRad="152400" dist="12000" dir="900000" sy="98000" kx="110000" ky="200000" algn="tl" rotWithShape="0">
+              <a:srgbClr val="000000">
+                <a:alpha val="30000"/>
+              </a:srgbClr>
+            </a:outerShdw>
+          </a:effectLst>
+          <a:scene3d>
+            <a:camera prst="perspectiveRelaxed">
+              <a:rot lat="19800000" lon="1200000" rev="20820000"/>
+            </a:camera>
+            <a:lightRig rig="threePt" dir="t"/>
+          </a:scene3d>
+          <a:sp3d contourW="6350" prstMaterial="matte">
+            <a:bevelT w="101600" h="101600"/>
+            <a:contourClr>
+              <a:srgbClr val="969696"/>
+            </a:contourClr>
+          </a:sp3d>
+        </p:spPr>
+      </p:pic>
+      <p:sp>
+        <p:nvSpPr>
+          <p:cNvPr id="5" name="Title 4">
+            <a:extLst>
+              <a:ext uri="{FF2B5EF4-FFF2-40B4-BE49-F238E27FC236}">
+                <a16:creationId xmlns:a16="http://schemas.microsoft.com/office/drawing/2014/main" id="{D58137FA-BE0D-C4EC-C9AF-AAFE03ED70DC}"/>
+              </a:ext>
+            </a:extLst>
+          </p:cNvPr>
+          <p:cNvSpPr>
+            <a:spLocks noGrp="1"/>
+          </p:cNvSpPr>
+          <p:nvPr>
+            <p:ph type="title"/>
+          </p:nvPr>
+        </p:nvSpPr>
+        <p:spPr>
+          <a:xfrm>
+            <a:off x="2174240" y="72887"/>
+            <a:ext cx="9255756" cy="1077003"/>
+          </a:xfrm>
+        </p:spPr>
+        <p:txBody>
+          <a:bodyPr/>
+          <a:lstStyle/>
+          <a:p>
+            <a:pPr algn="ctr"/>
+            <a:r>
+              <a:rPr lang="en-US" dirty="0">
+                <a:solidFill>
+                  <a:schemeClr val="accent4">
+                    <a:lumMod val="75000"/>
+                  </a:schemeClr>
+                </a:solidFill>
+                <a:latin typeface="Aharoni" panose="02010803020104030203" pitchFamily="2" charset="-79"/>
+                <a:cs typeface="Aharoni" panose="02010803020104030203" pitchFamily="2" charset="-79"/>
+              </a:rPr>
+              <a:t>Mastering openpyxl</a:t>
+            </a:r>
+          </a:p>
+        </p:txBody>
+      </p:sp>
+      <p:sp>
+        <p:nvSpPr>
+          <p:cNvPr id="8" name="TextBox 7">
+            <a:extLst>
+              <a:ext uri="{FF2B5EF4-FFF2-40B4-BE49-F238E27FC236}">
+                <a16:creationId xmlns:a16="http://schemas.microsoft.com/office/drawing/2014/main" id="{06F955B4-2168-FA82-3841-9912D55D2D4C}"/>
+              </a:ext>
+            </a:extLst>
+          </p:cNvPr>
+          <p:cNvSpPr txBox="1"/>
+          <p:nvPr/>
+        </p:nvSpPr>
+        <p:spPr>
+          <a:xfrm>
+            <a:off x="0" y="4859"/>
+            <a:ext cx="2336800" cy="1446550"/>
+          </a:xfrm>
+          <a:prstGeom prst="rect">
+            <a:avLst/>
+          </a:prstGeom>
+          <a:effectLst>
+            <a:outerShdw blurRad="76200" dist="12700" dir="2700000" sy="-23000" kx="-800400" algn="bl" rotWithShape="0">
+              <a:prstClr val="black">
+                <a:alpha val="20000"/>
+              </a:prstClr>
+            </a:outerShdw>
+          </a:effectLst>
+        </p:spPr>
+        <p:style>
+          <a:lnRef idx="1">
+            <a:schemeClr val="accent6"/>
+          </a:lnRef>
+          <a:fillRef idx="2">
+            <a:schemeClr val="accent6"/>
+          </a:fillRef>
+          <a:effectRef idx="1">
+            <a:schemeClr val="accent6"/>
+          </a:effectRef>
+          <a:fontRef idx="minor">
+            <a:schemeClr val="dk1"/>
+          </a:fontRef>
+        </p:style>
+        <p:txBody>
+          <a:bodyPr wrap="square" rtlCol="0" anchor="ctr">
+            <a:spAutoFit/>
+          </a:bodyPr>
+          <a:lstStyle/>
+          <a:p>
+            <a:pPr algn="ctr"/>
+            <a:r>
+              <a:rPr lang="en-US" sz="8800" dirty="0">
+                <a:solidFill>
+                  <a:schemeClr val="accent5"/>
+                </a:solidFill>
+                <a:latin typeface="Trade Gothic Next Heavy" panose="020F0502020204030204" pitchFamily="34" charset="0"/>
+              </a:rPr>
+              <a:t>014</a:t>
+            </a:r>
+          </a:p>
+        </p:txBody>
+      </p:sp>
+      <p:pic>
+        <p:nvPicPr>
+          <p:cNvPr id="9" name="Picture 8">
+            <a:extLst>
+              <a:ext uri="{FF2B5EF4-FFF2-40B4-BE49-F238E27FC236}">
+                <a16:creationId xmlns:a16="http://schemas.microsoft.com/office/drawing/2014/main" id="{DF207F8D-D575-10B4-F505-E062DEFEDC63}"/>
+              </a:ext>
+            </a:extLst>
+          </p:cNvPr>
+          <p:cNvPicPr>
+            <a:picLocks noChangeAspect="1"/>
+          </p:cNvPicPr>
+          <p:nvPr/>
+        </p:nvPicPr>
+        <p:blipFill>
+          <a:blip r:embed="rId3"/>
+          <a:stretch>
+            <a:fillRect/>
+          </a:stretch>
+        </p:blipFill>
+        <p:spPr>
+          <a:xfrm>
+            <a:off x="172720" y="5574693"/>
+            <a:ext cx="2661920" cy="1088498"/>
+          </a:xfrm>
+          <a:prstGeom prst="roundRect">
+            <a:avLst>
+              <a:gd name="adj" fmla="val 8594"/>
+            </a:avLst>
+          </a:prstGeom>
+          <a:solidFill>
+            <a:srgbClr val="FFFFFF">
+              <a:shade val="85000"/>
+            </a:srgbClr>
+          </a:solidFill>
+          <a:ln>
+            <a:noFill/>
+          </a:ln>
+          <a:effectLst>
+            <a:reflection blurRad="12700" stA="38000" endPos="28000" dist="5000" dir="5400000" sy="-100000" algn="bl" rotWithShape="0"/>
+          </a:effectLst>
+        </p:spPr>
+      </p:pic>
+      <p:sp>
+        <p:nvSpPr>
+          <p:cNvPr id="7" name="Content Placeholder 6">
+            <a:extLst>
+              <a:ext uri="{FF2B5EF4-FFF2-40B4-BE49-F238E27FC236}">
+                <a16:creationId xmlns:a16="http://schemas.microsoft.com/office/drawing/2014/main" id="{976A6473-A9D0-6A13-D8BD-8C1884AFC933}"/>
+              </a:ext>
+            </a:extLst>
+          </p:cNvPr>
+          <p:cNvSpPr>
+            <a:spLocks noGrp="1"/>
+          </p:cNvSpPr>
+          <p:nvPr>
+            <p:ph sz="quarter" idx="10"/>
+          </p:nvPr>
+        </p:nvSpPr>
+        <p:spPr>
+          <a:xfrm>
+            <a:off x="3032760" y="5076647"/>
+            <a:ext cx="8750300" cy="1781353"/>
+          </a:xfrm>
+          <a:ln>
+            <a:noFill/>
+          </a:ln>
+        </p:spPr>
+        <p:style>
+          <a:lnRef idx="1">
+            <a:schemeClr val="accent3"/>
+          </a:lnRef>
+          <a:fillRef idx="2">
+            <a:schemeClr val="accent3"/>
+          </a:fillRef>
+          <a:effectRef idx="1">
+            <a:schemeClr val="accent3"/>
+          </a:effectRef>
+          <a:fontRef idx="minor">
+            <a:schemeClr val="dk1"/>
+          </a:fontRef>
+        </p:style>
+        <p:txBody>
+          <a:bodyPr anchor="ctr">
+            <a:normAutofit/>
+          </a:bodyPr>
+          <a:lstStyle/>
+          <a:p>
+            <a:r>
+              <a:rPr lang="en-US" sz="4400" b="1" dirty="0">
+                <a:solidFill>
+                  <a:schemeClr val="accent4">
+                    <a:lumMod val="75000"/>
+                  </a:schemeClr>
+                </a:solidFill>
+                <a:latin typeface="72 Black" panose="020B0A04030603020204" pitchFamily="34" charset="0"/>
+                <a:cs typeface="72 Black" panose="020B0A04030603020204" pitchFamily="34" charset="0"/>
+              </a:rPr>
+              <a:t>3. Cells and Cells Values</a:t>
+            </a:r>
+          </a:p>
+          <a:p>
+            <a:r>
+              <a:rPr lang="en-US" sz="4400" b="1" dirty="0">
+                <a:solidFill>
+                  <a:schemeClr val="accent4">
+                    <a:lumMod val="75000"/>
+                  </a:schemeClr>
+                </a:solidFill>
+                <a:latin typeface="72 Black" panose="020B0A04030603020204" pitchFamily="34" charset="0"/>
+                <a:cs typeface="72 Black" panose="020B0A04030603020204" pitchFamily="34" charset="0"/>
+              </a:rPr>
+              <a:t>3.5 Number Formatting</a:t>
+            </a:r>
+          </a:p>
+        </p:txBody>
+      </p:sp>
+    </p:spTree>
+    <p:extLst>
+      <p:ext uri="{BB962C8B-B14F-4D97-AF65-F5344CB8AC3E}">
+        <p14:creationId xmlns:p14="http://schemas.microsoft.com/office/powerpoint/2010/main" val="1352834161"/>
+      </p:ext>
+    </p:extLst>
+  </p:cSld>
+  <p:clrMapOvr>
+    <a:masterClrMapping/>
+  </p:clrMapOvr>
+</p:sld>
+</file>
+
+<file path=ppt/slides/slide15.xml><?xml version="1.0" encoding="utf-8"?>
+<p:sld xmlns:a="http://schemas.openxmlformats.org/drawingml/2006/main" xmlns:r="http://schemas.openxmlformats.org/officeDocument/2006/relationships" xmlns:p="http://schemas.openxmlformats.org/presentationml/2006/main">
+  <p:cSld>
+    <p:spTree>
+      <p:nvGrpSpPr>
+        <p:cNvPr id="1" name="">
+          <a:extLst>
+            <a:ext uri="{FF2B5EF4-FFF2-40B4-BE49-F238E27FC236}">
+              <a16:creationId xmlns:a16="http://schemas.microsoft.com/office/drawing/2014/main" id="{FBA00529-AE0F-BE5E-DAC5-9CB3C7676A1A}"/>
+            </a:ext>
+          </a:extLst>
+        </p:cNvPr>
+        <p:cNvGrpSpPr/>
+        <p:nvPr/>
+      </p:nvGrpSpPr>
+      <p:grpSpPr>
+        <a:xfrm>
+          <a:off x="0" y="0"/>
+          <a:ext cx="0" cy="0"/>
+          <a:chOff x="0" y="0"/>
+          <a:chExt cx="0" cy="0"/>
+        </a:xfrm>
+      </p:grpSpPr>
+      <p:pic>
+        <p:nvPicPr>
+          <p:cNvPr id="4" name="Picture 3">
+            <a:extLst>
+              <a:ext uri="{FF2B5EF4-FFF2-40B4-BE49-F238E27FC236}">
+                <a16:creationId xmlns:a16="http://schemas.microsoft.com/office/drawing/2014/main" id="{16E883A6-282D-E686-C656-BB5A572BD5A9}"/>
+              </a:ext>
+            </a:extLst>
+          </p:cNvPr>
+          <p:cNvPicPr>
+            <a:picLocks noChangeAspect="1"/>
+          </p:cNvPicPr>
+          <p:nvPr/>
+        </p:nvPicPr>
+        <p:blipFill>
+          <a:blip r:embed="rId2"/>
+          <a:stretch>
+            <a:fillRect/>
+          </a:stretch>
+        </p:blipFill>
+        <p:spPr>
+          <a:xfrm>
+            <a:off x="381002" y="480678"/>
+            <a:ext cx="9255756" cy="5868219"/>
+          </a:xfrm>
+          <a:prstGeom prst="roundRect">
+            <a:avLst>
+              <a:gd name="adj" fmla="val 16667"/>
+            </a:avLst>
+          </a:prstGeom>
+          <a:ln>
+            <a:noFill/>
+          </a:ln>
+          <a:effectLst>
+            <a:outerShdw blurRad="152400" dist="12000" dir="900000" sy="98000" kx="110000" ky="200000" algn="tl" rotWithShape="0">
+              <a:srgbClr val="000000">
+                <a:alpha val="30000"/>
+              </a:srgbClr>
+            </a:outerShdw>
+          </a:effectLst>
+          <a:scene3d>
+            <a:camera prst="perspectiveRelaxed">
+              <a:rot lat="19800000" lon="1200000" rev="20820000"/>
+            </a:camera>
+            <a:lightRig rig="threePt" dir="t"/>
+          </a:scene3d>
+          <a:sp3d contourW="6350" prstMaterial="matte">
+            <a:bevelT w="101600" h="101600"/>
+            <a:contourClr>
+              <a:srgbClr val="969696"/>
+            </a:contourClr>
+          </a:sp3d>
+        </p:spPr>
+      </p:pic>
+      <p:sp>
+        <p:nvSpPr>
+          <p:cNvPr id="5" name="Title 4">
+            <a:extLst>
+              <a:ext uri="{FF2B5EF4-FFF2-40B4-BE49-F238E27FC236}">
+                <a16:creationId xmlns:a16="http://schemas.microsoft.com/office/drawing/2014/main" id="{C39F4055-7EDE-AD41-A8C0-1287945E82DB}"/>
+              </a:ext>
+            </a:extLst>
+          </p:cNvPr>
+          <p:cNvSpPr>
+            <a:spLocks noGrp="1"/>
+          </p:cNvSpPr>
+          <p:nvPr>
+            <p:ph type="title"/>
+          </p:nvPr>
+        </p:nvSpPr>
+        <p:spPr>
+          <a:xfrm>
+            <a:off x="2174240" y="72887"/>
+            <a:ext cx="9255756" cy="1077003"/>
+          </a:xfrm>
+        </p:spPr>
+        <p:txBody>
+          <a:bodyPr/>
+          <a:lstStyle/>
+          <a:p>
+            <a:pPr algn="ctr"/>
+            <a:r>
+              <a:rPr lang="en-US" dirty="0">
+                <a:solidFill>
+                  <a:schemeClr val="accent4">
+                    <a:lumMod val="75000"/>
+                  </a:schemeClr>
+                </a:solidFill>
+                <a:latin typeface="Aharoni" panose="02010803020104030203" pitchFamily="2" charset="-79"/>
+                <a:cs typeface="Aharoni" panose="02010803020104030203" pitchFamily="2" charset="-79"/>
+              </a:rPr>
+              <a:t>Mastering openpyxl</a:t>
+            </a:r>
+          </a:p>
+        </p:txBody>
+      </p:sp>
+      <p:sp>
+        <p:nvSpPr>
+          <p:cNvPr id="8" name="TextBox 7">
+            <a:extLst>
+              <a:ext uri="{FF2B5EF4-FFF2-40B4-BE49-F238E27FC236}">
+                <a16:creationId xmlns:a16="http://schemas.microsoft.com/office/drawing/2014/main" id="{4EECC5F0-BEFF-691F-8BAC-1C63FDCAA138}"/>
+              </a:ext>
+            </a:extLst>
+          </p:cNvPr>
+          <p:cNvSpPr txBox="1"/>
+          <p:nvPr/>
+        </p:nvSpPr>
+        <p:spPr>
+          <a:xfrm>
+            <a:off x="0" y="4859"/>
+            <a:ext cx="2336800" cy="1446550"/>
+          </a:xfrm>
+          <a:prstGeom prst="rect">
+            <a:avLst/>
+          </a:prstGeom>
+          <a:effectLst>
+            <a:outerShdw blurRad="76200" dist="12700" dir="2700000" sy="-23000" kx="-800400" algn="bl" rotWithShape="0">
+              <a:prstClr val="black">
+                <a:alpha val="20000"/>
+              </a:prstClr>
+            </a:outerShdw>
+          </a:effectLst>
+        </p:spPr>
+        <p:style>
+          <a:lnRef idx="1">
+            <a:schemeClr val="accent6"/>
+          </a:lnRef>
+          <a:fillRef idx="2">
+            <a:schemeClr val="accent6"/>
+          </a:fillRef>
+          <a:effectRef idx="1">
+            <a:schemeClr val="accent6"/>
+          </a:effectRef>
+          <a:fontRef idx="minor">
+            <a:schemeClr val="dk1"/>
+          </a:fontRef>
+        </p:style>
+        <p:txBody>
+          <a:bodyPr wrap="square" rtlCol="0" anchor="ctr">
+            <a:spAutoFit/>
+          </a:bodyPr>
+          <a:lstStyle/>
+          <a:p>
+            <a:pPr algn="ctr"/>
+            <a:r>
+              <a:rPr lang="en-US" sz="8800" dirty="0">
+                <a:solidFill>
+                  <a:schemeClr val="accent5"/>
+                </a:solidFill>
+                <a:latin typeface="Trade Gothic Next Heavy" panose="020F0502020204030204" pitchFamily="34" charset="0"/>
+              </a:rPr>
+              <a:t>015</a:t>
+            </a:r>
+          </a:p>
+        </p:txBody>
+      </p:sp>
+      <p:pic>
+        <p:nvPicPr>
+          <p:cNvPr id="9" name="Picture 8">
+            <a:extLst>
+              <a:ext uri="{FF2B5EF4-FFF2-40B4-BE49-F238E27FC236}">
+                <a16:creationId xmlns:a16="http://schemas.microsoft.com/office/drawing/2014/main" id="{257163AA-071A-3208-189E-8DDCF81501EE}"/>
+              </a:ext>
+            </a:extLst>
+          </p:cNvPr>
+          <p:cNvPicPr>
+            <a:picLocks noChangeAspect="1"/>
+          </p:cNvPicPr>
+          <p:nvPr/>
+        </p:nvPicPr>
+        <p:blipFill>
+          <a:blip r:embed="rId3"/>
+          <a:stretch>
+            <a:fillRect/>
+          </a:stretch>
+        </p:blipFill>
+        <p:spPr>
+          <a:xfrm>
+            <a:off x="172720" y="5574693"/>
+            <a:ext cx="2661920" cy="1088498"/>
+          </a:xfrm>
+          <a:prstGeom prst="roundRect">
+            <a:avLst>
+              <a:gd name="adj" fmla="val 8594"/>
+            </a:avLst>
+          </a:prstGeom>
+          <a:solidFill>
+            <a:srgbClr val="FFFFFF">
+              <a:shade val="85000"/>
+            </a:srgbClr>
+          </a:solidFill>
+          <a:ln>
+            <a:noFill/>
+          </a:ln>
+          <a:effectLst>
+            <a:reflection blurRad="12700" stA="38000" endPos="28000" dist="5000" dir="5400000" sy="-100000" algn="bl" rotWithShape="0"/>
+          </a:effectLst>
+        </p:spPr>
+      </p:pic>
+      <p:sp>
+        <p:nvSpPr>
+          <p:cNvPr id="7" name="Content Placeholder 6">
+            <a:extLst>
+              <a:ext uri="{FF2B5EF4-FFF2-40B4-BE49-F238E27FC236}">
+                <a16:creationId xmlns:a16="http://schemas.microsoft.com/office/drawing/2014/main" id="{928FB6D5-0C2E-9CCC-9159-0FAC97FC8612}"/>
+              </a:ext>
+            </a:extLst>
+          </p:cNvPr>
+          <p:cNvSpPr>
+            <a:spLocks noGrp="1"/>
+          </p:cNvSpPr>
+          <p:nvPr>
+            <p:ph sz="quarter" idx="10"/>
+          </p:nvPr>
+        </p:nvSpPr>
+        <p:spPr>
+          <a:xfrm>
+            <a:off x="3032760" y="5076647"/>
+            <a:ext cx="8750300" cy="1781353"/>
+          </a:xfrm>
+          <a:ln>
+            <a:noFill/>
+          </a:ln>
+        </p:spPr>
+        <p:style>
+          <a:lnRef idx="1">
+            <a:schemeClr val="accent3"/>
+          </a:lnRef>
+          <a:fillRef idx="2">
+            <a:schemeClr val="accent3"/>
+          </a:fillRef>
+          <a:effectRef idx="1">
+            <a:schemeClr val="accent3"/>
+          </a:effectRef>
+          <a:fontRef idx="minor">
+            <a:schemeClr val="dk1"/>
+          </a:fontRef>
+        </p:style>
+        <p:txBody>
+          <a:bodyPr anchor="ctr">
+            <a:normAutofit/>
+          </a:bodyPr>
+          <a:lstStyle/>
+          <a:p>
+            <a:r>
+              <a:rPr lang="en-US" sz="4400" b="1" dirty="0">
+                <a:solidFill>
+                  <a:schemeClr val="accent4">
+                    <a:lumMod val="75000"/>
+                  </a:schemeClr>
+                </a:solidFill>
+                <a:latin typeface="72 Black" panose="020B0A04030603020204" pitchFamily="34" charset="0"/>
+                <a:cs typeface="72 Black" panose="020B0A04030603020204" pitchFamily="34" charset="0"/>
+              </a:rPr>
+              <a:t>3. Cells and Cells Values</a:t>
+            </a:r>
+          </a:p>
+          <a:p>
+            <a:r>
+              <a:rPr lang="en-US" sz="4400" b="1" dirty="0">
+                <a:solidFill>
+                  <a:schemeClr val="accent4">
+                    <a:lumMod val="75000"/>
+                  </a:schemeClr>
+                </a:solidFill>
+                <a:latin typeface="72 Black" panose="020B0A04030603020204" pitchFamily="34" charset="0"/>
+                <a:cs typeface="72 Black" panose="020B0A04030603020204" pitchFamily="34" charset="0"/>
+              </a:rPr>
+              <a:t>3.6 Dates and Times</a:t>
+            </a:r>
+          </a:p>
+        </p:txBody>
+      </p:sp>
+    </p:spTree>
+    <p:extLst>
+      <p:ext uri="{BB962C8B-B14F-4D97-AF65-F5344CB8AC3E}">
+        <p14:creationId xmlns:p14="http://schemas.microsoft.com/office/powerpoint/2010/main" val="1859524948"/>
+      </p:ext>
+    </p:extLst>
+  </p:cSld>
+  <p:clrMapOvr>
+    <a:masterClrMapping/>
+  </p:clrMapOvr>
+</p:sld>
+</file>
+
+<file path=ppt/slides/slide16.xml><?xml version="1.0" encoding="utf-8"?>
+<p:sld xmlns:a="http://schemas.openxmlformats.org/drawingml/2006/main" xmlns:r="http://schemas.openxmlformats.org/officeDocument/2006/relationships" xmlns:p="http://schemas.openxmlformats.org/presentationml/2006/main">
+  <p:cSld>
+    <p:spTree>
+      <p:nvGrpSpPr>
+        <p:cNvPr id="1" name="">
+          <a:extLst>
+            <a:ext uri="{FF2B5EF4-FFF2-40B4-BE49-F238E27FC236}">
+              <a16:creationId xmlns:a16="http://schemas.microsoft.com/office/drawing/2014/main" id="{B34D2D22-6D4A-B684-FFD9-6BD2849D4A12}"/>
+            </a:ext>
+          </a:extLst>
+        </p:cNvPr>
+        <p:cNvGrpSpPr/>
+        <p:nvPr/>
+      </p:nvGrpSpPr>
+      <p:grpSpPr>
+        <a:xfrm>
+          <a:off x="0" y="0"/>
+          <a:ext cx="0" cy="0"/>
+          <a:chOff x="0" y="0"/>
+          <a:chExt cx="0" cy="0"/>
+        </a:xfrm>
+      </p:grpSpPr>
+      <p:pic>
+        <p:nvPicPr>
+          <p:cNvPr id="3" name="Picture 2">
+            <a:extLst>
+              <a:ext uri="{FF2B5EF4-FFF2-40B4-BE49-F238E27FC236}">
+                <a16:creationId xmlns:a16="http://schemas.microsoft.com/office/drawing/2014/main" id="{874C0167-5B91-1D7A-83E8-13CBD90BD9C0}"/>
+              </a:ext>
+            </a:extLst>
+          </p:cNvPr>
+          <p:cNvPicPr>
+            <a:picLocks noChangeAspect="1"/>
+          </p:cNvPicPr>
+          <p:nvPr/>
+        </p:nvPicPr>
+        <p:blipFill>
+          <a:blip r:embed="rId2"/>
+          <a:stretch>
+            <a:fillRect/>
+          </a:stretch>
+        </p:blipFill>
+        <p:spPr>
+          <a:xfrm>
+            <a:off x="642479" y="456761"/>
+            <a:ext cx="8831721" cy="5811061"/>
+          </a:xfrm>
+          <a:prstGeom prst="roundRect">
+            <a:avLst>
+              <a:gd name="adj" fmla="val 16667"/>
+            </a:avLst>
+          </a:prstGeom>
+          <a:ln>
+            <a:noFill/>
+          </a:ln>
+          <a:effectLst>
+            <a:outerShdw blurRad="152400" dist="12000" dir="900000" sy="98000" kx="110000" ky="200000" algn="tl" rotWithShape="0">
+              <a:srgbClr val="000000">
+                <a:alpha val="30000"/>
+              </a:srgbClr>
+            </a:outerShdw>
+          </a:effectLst>
+          <a:scene3d>
+            <a:camera prst="perspectiveRelaxed">
+              <a:rot lat="19800000" lon="1200000" rev="20820000"/>
+            </a:camera>
+            <a:lightRig rig="threePt" dir="t"/>
+          </a:scene3d>
+          <a:sp3d contourW="6350" prstMaterial="matte">
+            <a:bevelT w="101600" h="101600"/>
+            <a:contourClr>
+              <a:srgbClr val="969696"/>
+            </a:contourClr>
+          </a:sp3d>
+        </p:spPr>
+      </p:pic>
+      <p:sp>
+        <p:nvSpPr>
+          <p:cNvPr id="5" name="Title 4">
+            <a:extLst>
+              <a:ext uri="{FF2B5EF4-FFF2-40B4-BE49-F238E27FC236}">
+                <a16:creationId xmlns:a16="http://schemas.microsoft.com/office/drawing/2014/main" id="{AAF4E118-ADEF-2835-B8B7-2DB3B434187C}"/>
+              </a:ext>
+            </a:extLst>
+          </p:cNvPr>
+          <p:cNvSpPr>
+            <a:spLocks noGrp="1"/>
+          </p:cNvSpPr>
+          <p:nvPr>
+            <p:ph type="title"/>
+          </p:nvPr>
+        </p:nvSpPr>
+        <p:spPr>
+          <a:xfrm>
+            <a:off x="2174240" y="72887"/>
+            <a:ext cx="9255756" cy="1077003"/>
+          </a:xfrm>
+        </p:spPr>
+        <p:txBody>
+          <a:bodyPr/>
+          <a:lstStyle/>
+          <a:p>
+            <a:pPr algn="ctr"/>
+            <a:r>
+              <a:rPr lang="en-US" dirty="0">
+                <a:solidFill>
+                  <a:schemeClr val="accent4">
+                    <a:lumMod val="75000"/>
+                  </a:schemeClr>
+                </a:solidFill>
+                <a:latin typeface="Aharoni" panose="02010803020104030203" pitchFamily="2" charset="-79"/>
+                <a:cs typeface="Aharoni" panose="02010803020104030203" pitchFamily="2" charset="-79"/>
+              </a:rPr>
+              <a:t>Mastering openpyxl</a:t>
+            </a:r>
+          </a:p>
+        </p:txBody>
+      </p:sp>
+      <p:sp>
+        <p:nvSpPr>
+          <p:cNvPr id="8" name="TextBox 7">
+            <a:extLst>
+              <a:ext uri="{FF2B5EF4-FFF2-40B4-BE49-F238E27FC236}">
+                <a16:creationId xmlns:a16="http://schemas.microsoft.com/office/drawing/2014/main" id="{240C36E6-E84A-0B02-71D2-E63B0A65BD3A}"/>
+              </a:ext>
+            </a:extLst>
+          </p:cNvPr>
+          <p:cNvSpPr txBox="1"/>
+          <p:nvPr/>
+        </p:nvSpPr>
+        <p:spPr>
+          <a:xfrm>
+            <a:off x="0" y="4859"/>
+            <a:ext cx="2336800" cy="1446550"/>
+          </a:xfrm>
+          <a:prstGeom prst="rect">
+            <a:avLst/>
+          </a:prstGeom>
+          <a:effectLst>
+            <a:outerShdw blurRad="76200" dist="12700" dir="2700000" sy="-23000" kx="-800400" algn="bl" rotWithShape="0">
+              <a:prstClr val="black">
+                <a:alpha val="20000"/>
+              </a:prstClr>
+            </a:outerShdw>
+          </a:effectLst>
+        </p:spPr>
+        <p:style>
+          <a:lnRef idx="1">
+            <a:schemeClr val="accent6"/>
+          </a:lnRef>
+          <a:fillRef idx="2">
+            <a:schemeClr val="accent6"/>
+          </a:fillRef>
+          <a:effectRef idx="1">
+            <a:schemeClr val="accent6"/>
+          </a:effectRef>
+          <a:fontRef idx="minor">
+            <a:schemeClr val="dk1"/>
+          </a:fontRef>
+        </p:style>
+        <p:txBody>
+          <a:bodyPr wrap="square" rtlCol="0" anchor="ctr">
+            <a:spAutoFit/>
+          </a:bodyPr>
+          <a:lstStyle/>
+          <a:p>
+            <a:pPr algn="ctr"/>
+            <a:r>
+              <a:rPr lang="en-US" sz="8800" dirty="0">
+                <a:solidFill>
+                  <a:schemeClr val="accent5"/>
+                </a:solidFill>
+                <a:latin typeface="Trade Gothic Next Heavy" panose="020F0502020204030204" pitchFamily="34" charset="0"/>
+              </a:rPr>
+              <a:t>016</a:t>
+            </a:r>
+          </a:p>
+        </p:txBody>
+      </p:sp>
+      <p:pic>
+        <p:nvPicPr>
+          <p:cNvPr id="9" name="Picture 8">
+            <a:extLst>
+              <a:ext uri="{FF2B5EF4-FFF2-40B4-BE49-F238E27FC236}">
+                <a16:creationId xmlns:a16="http://schemas.microsoft.com/office/drawing/2014/main" id="{E60A533D-24B3-ADAD-2988-831A472668BF}"/>
+              </a:ext>
+            </a:extLst>
+          </p:cNvPr>
+          <p:cNvPicPr>
+            <a:picLocks noChangeAspect="1"/>
+          </p:cNvPicPr>
+          <p:nvPr/>
+        </p:nvPicPr>
+        <p:blipFill>
+          <a:blip r:embed="rId3"/>
+          <a:stretch>
+            <a:fillRect/>
+          </a:stretch>
+        </p:blipFill>
+        <p:spPr>
+          <a:xfrm>
+            <a:off x="172720" y="5574693"/>
+            <a:ext cx="2661920" cy="1088498"/>
+          </a:xfrm>
+          <a:prstGeom prst="roundRect">
+            <a:avLst>
+              <a:gd name="adj" fmla="val 8594"/>
+            </a:avLst>
+          </a:prstGeom>
+          <a:solidFill>
+            <a:srgbClr val="FFFFFF">
+              <a:shade val="85000"/>
+            </a:srgbClr>
+          </a:solidFill>
+          <a:ln>
+            <a:noFill/>
+          </a:ln>
+          <a:effectLst>
+            <a:reflection blurRad="12700" stA="38000" endPos="28000" dist="5000" dir="5400000" sy="-100000" algn="bl" rotWithShape="0"/>
+          </a:effectLst>
+        </p:spPr>
+      </p:pic>
+      <p:sp>
+        <p:nvSpPr>
+          <p:cNvPr id="7" name="Content Placeholder 6">
+            <a:extLst>
+              <a:ext uri="{FF2B5EF4-FFF2-40B4-BE49-F238E27FC236}">
+                <a16:creationId xmlns:a16="http://schemas.microsoft.com/office/drawing/2014/main" id="{1DF940DF-2353-7EF2-40C2-F28157227C8E}"/>
+              </a:ext>
+            </a:extLst>
+          </p:cNvPr>
+          <p:cNvSpPr>
+            <a:spLocks noGrp="1"/>
+          </p:cNvSpPr>
+          <p:nvPr>
+            <p:ph sz="quarter" idx="10"/>
+          </p:nvPr>
+        </p:nvSpPr>
+        <p:spPr>
+          <a:xfrm>
+            <a:off x="3032760" y="5076647"/>
+            <a:ext cx="8750300" cy="1781353"/>
+          </a:xfrm>
+          <a:ln>
+            <a:noFill/>
+          </a:ln>
+        </p:spPr>
+        <p:style>
+          <a:lnRef idx="1">
+            <a:schemeClr val="accent3"/>
+          </a:lnRef>
+          <a:fillRef idx="2">
+            <a:schemeClr val="accent3"/>
+          </a:fillRef>
+          <a:effectRef idx="1">
+            <a:schemeClr val="accent3"/>
+          </a:effectRef>
+          <a:fontRef idx="minor">
+            <a:schemeClr val="dk1"/>
+          </a:fontRef>
+        </p:style>
+        <p:txBody>
+          <a:bodyPr anchor="ctr">
+            <a:normAutofit/>
+          </a:bodyPr>
+          <a:lstStyle/>
+          <a:p>
+            <a:r>
+              <a:rPr lang="en-US" sz="4400" b="1" dirty="0">
+                <a:solidFill>
+                  <a:schemeClr val="accent4">
+                    <a:lumMod val="75000"/>
+                  </a:schemeClr>
+                </a:solidFill>
+                <a:latin typeface="72 Black" panose="020B0A04030603020204" pitchFamily="34" charset="0"/>
+                <a:cs typeface="72 Black" panose="020B0A04030603020204" pitchFamily="34" charset="0"/>
+              </a:rPr>
+              <a:t>3. Cells and Cells Values</a:t>
+            </a:r>
+          </a:p>
+          <a:p>
+            <a:r>
+              <a:rPr lang="en-US" sz="4400" b="1" dirty="0">
+                <a:solidFill>
+                  <a:schemeClr val="accent4">
+                    <a:lumMod val="75000"/>
+                  </a:schemeClr>
+                </a:solidFill>
+                <a:latin typeface="72 Black" panose="020B0A04030603020204" pitchFamily="34" charset="0"/>
+                <a:cs typeface="72 Black" panose="020B0A04030603020204" pitchFamily="34" charset="0"/>
+              </a:rPr>
+              <a:t>3.7 Working with Cell Ranges</a:t>
+            </a:r>
+          </a:p>
+        </p:txBody>
+      </p:sp>
+    </p:spTree>
+    <p:extLst>
+      <p:ext uri="{BB962C8B-B14F-4D97-AF65-F5344CB8AC3E}">
+        <p14:creationId xmlns:p14="http://schemas.microsoft.com/office/powerpoint/2010/main" val="2619217955"/>
+      </p:ext>
+    </p:extLst>
+  </p:cSld>
+  <p:clrMapOvr>
+    <a:masterClrMapping/>
+  </p:clrMapOvr>
+</p:sld>
+</file>
+
+<file path=ppt/slides/slide17.xml><?xml version="1.0" encoding="utf-8"?>
 <p:sld xmlns:a="http://schemas.openxmlformats.org/drawingml/2006/main" xmlns:r="http://schemas.openxmlformats.org/officeDocument/2006/relationships" xmlns:p="http://schemas.openxmlformats.org/presentationml/2006/main">
   <p:cSld>
     <p:spTree>

</xml_diff>